<commit_message>
lesson 4 to 7
</commit_message>
<xml_diff>
--- a/Lesson-5-Hyperlinks/Lesson-5-Hyperlinks.pptx
+++ b/Lesson-5-Hyperlinks/Lesson-5-Hyperlinks.pptx
@@ -45,7 +45,7 @@
   <p:notesSz cx="6858000" cy="9144000"/>
   <p:embeddedFontLst>
     <p:embeddedFont>
-      <p:font typeface="Francois One" panose="020B0604020202020204" charset="0"/>
+      <p:font typeface="Francois One" panose="02000503040000020004" pitchFamily="2" charset="77"/>
       <p:regular r:id="rId35"/>
     </p:embeddedFont>
     <p:embeddedFont>
@@ -56,7 +56,7 @@
       <p:boldItalic r:id="rId39"/>
     </p:embeddedFont>
     <p:embeddedFont>
-      <p:font typeface="Roboto Mono" panose="020B0604020202020204" charset="0"/>
+      <p:font typeface="Roboto Mono" pitchFamily="49" charset="0"/>
       <p:regular r:id="rId40"/>
       <p:bold r:id="rId41"/>
       <p:italic r:id="rId42"/>
@@ -17156,7 +17156,7 @@
                 <a:buChar char="●"/>
               </a:pPr>
               <a:r>
-                <a:rPr lang="en-GB" sz="1000">
+                <a:rPr lang="en-GB" sz="1000" dirty="0">
                   <a:solidFill>
                     <a:srgbClr val="595959"/>
                   </a:solidFill>
@@ -17167,72 +17167,7 @@
                 </a:rPr>
                 <a:t>We could use an ID selector to style one hyperlink, or a class selector to style a group of them</a:t>
               </a:r>
-              <a:endParaRPr sz="1000">
-                <a:solidFill>
-                  <a:srgbClr val="595959"/>
-                </a:solidFill>
-                <a:latin typeface="Roboto"/>
-                <a:ea typeface="Roboto"/>
-                <a:cs typeface="Roboto"/>
-                <a:sym typeface="Roboto"/>
-              </a:endParaRPr>
-            </a:p>
-            <a:p>
-              <a:pPr marL="457200" lvl="0" indent="-292100" algn="l" rtl="0">
-                <a:lnSpc>
-                  <a:spcPct val="115000"/>
-                </a:lnSpc>
-                <a:spcBef>
-                  <a:spcPts val="0"/>
-                </a:spcBef>
-                <a:spcAft>
-                  <a:spcPts val="0"/>
-                </a:spcAft>
-                <a:buClr>
-                  <a:srgbClr val="595959"/>
-                </a:buClr>
-                <a:buSzPts val="1000"/>
-                <a:buFont typeface="Roboto"/>
-                <a:buChar char="●"/>
-              </a:pPr>
-              <a:r>
-                <a:rPr lang="en-GB" sz="1000">
-                  <a:solidFill>
-                    <a:srgbClr val="595959"/>
-                  </a:solidFill>
-                  <a:latin typeface="Roboto"/>
-                  <a:ea typeface="Roboto"/>
-                  <a:cs typeface="Roboto"/>
-                  <a:sym typeface="Roboto"/>
-                </a:rPr>
-                <a:t>See </a:t>
-              </a:r>
-              <a:r>
-                <a:rPr lang="en-GB" sz="1000" u="sng">
-                  <a:solidFill>
-                    <a:schemeClr val="hlink"/>
-                  </a:solidFill>
-                  <a:latin typeface="Roboto"/>
-                  <a:ea typeface="Roboto"/>
-                  <a:cs typeface="Roboto"/>
-                  <a:sym typeface="Roboto"/>
-                  <a:hlinkClick r:id="rId6"/>
-                </a:rPr>
-                <a:t>Lesson 3</a:t>
-              </a:r>
-              <a:r>
-                <a:rPr lang="en-GB" sz="1000">
-                  <a:solidFill>
-                    <a:srgbClr val="595959"/>
-                  </a:solidFill>
-                  <a:latin typeface="Roboto"/>
-                  <a:ea typeface="Roboto"/>
-                  <a:cs typeface="Roboto"/>
-                  <a:sym typeface="Roboto"/>
-                </a:rPr>
-                <a:t> if you'd like to do this!</a:t>
-              </a:r>
-              <a:endParaRPr sz="1000">
+              <a:endParaRPr sz="1000" dirty="0">
                 <a:solidFill>
                   <a:srgbClr val="595959"/>
                 </a:solidFill>

</xml_diff>